<commit_message>
Working on assignment part b now
</commit_message>
<xml_diff>
--- a/Advanced Artificial Intelligence/AAI Assignment 1/Assignment CPT.pptx
+++ b/Advanced Artificial Intelligence/AAI Assignment 1/Assignment CPT.pptx
@@ -104,6 +104,11 @@
       </a:defRPr>
     </a:lvl9pPr>
   </p:defaultTextStyle>
+  <p:extLst>
+    <p:ext uri="{EFAFB233-063F-42B5-8137-9DF3F51BA10A}">
+      <p15:sldGuideLst xmlns:p15="http://schemas.microsoft.com/office/powerpoint/2012/main"/>
+    </p:ext>
+  </p:extLst>
 </p:presentation>
 </file>
 
@@ -2973,7 +2978,7 @@
           <p:nvPr>
             <p:extLst>
               <p:ext uri="{D42A27DB-BD31-4B8C-83A1-F6EECF244321}">
-                <p14:modId xmlns:p14="http://schemas.microsoft.com/office/powerpoint/2010/main" val="3291898311"/>
+                <p14:modId xmlns:p14="http://schemas.microsoft.com/office/powerpoint/2010/main" val="2829447966"/>
               </p:ext>
             </p:extLst>
           </p:nvPr>
@@ -3131,14 +3136,14 @@
           <p:nvPr>
             <p:extLst>
               <p:ext uri="{D42A27DB-BD31-4B8C-83A1-F6EECF244321}">
-                <p14:modId xmlns:p14="http://schemas.microsoft.com/office/powerpoint/2010/main" val="3684479491"/>
+                <p14:modId xmlns:p14="http://schemas.microsoft.com/office/powerpoint/2010/main" val="3760828590"/>
               </p:ext>
             </p:extLst>
           </p:nvPr>
         </p:nvGraphicFramePr>
         <p:xfrm>
           <a:off x="5866014" y="1965291"/>
-          <a:ext cx="2779221" cy="741680"/>
+          <a:ext cx="3716396" cy="1112520"/>
         </p:xfrm>
         <a:graphic>
           <a:graphicData uri="http://schemas.openxmlformats.org/drawingml/2006/table">
@@ -3147,21 +3152,28 @@
                 <a:tableStyleId>{5C22544A-7EE6-4342-B048-85BDC9FD1C3A}</a:tableStyleId>
               </a:tblPr>
               <a:tblGrid>
-                <a:gridCol w="926407">
+                <a:gridCol w="929099">
+                  <a:extLst>
+                    <a:ext uri="{9D8B030D-6E8A-4147-A177-3AD203B41FA5}">
+                      <a16:colId xmlns:a16="http://schemas.microsoft.com/office/drawing/2014/main" val="3215425469"/>
+                    </a:ext>
+                  </a:extLst>
+                </a:gridCol>
+                <a:gridCol w="929099">
                   <a:extLst>
                     <a:ext uri="{9D8B030D-6E8A-4147-A177-3AD203B41FA5}">
                       <a16:colId xmlns:a16="http://schemas.microsoft.com/office/drawing/2014/main" val="1911690370"/>
                     </a:ext>
                   </a:extLst>
                 </a:gridCol>
-                <a:gridCol w="926407">
+                <a:gridCol w="929099">
                   <a:extLst>
                     <a:ext uri="{9D8B030D-6E8A-4147-A177-3AD203B41FA5}">
                       <a16:colId xmlns:a16="http://schemas.microsoft.com/office/drawing/2014/main" val="2754765569"/>
                     </a:ext>
                   </a:extLst>
                 </a:gridCol>
-                <a:gridCol w="926407">
+                <a:gridCol w="929099">
                   <a:extLst>
                     <a:ext uri="{9D8B030D-6E8A-4147-A177-3AD203B41FA5}">
                       <a16:colId xmlns:a16="http://schemas.microsoft.com/office/drawing/2014/main" val="247812292"/>
@@ -3170,6 +3182,20 @@
                 </a:gridCol>
               </a:tblGrid>
               <a:tr h="370840">
+                <a:tc>
+                  <a:txBody>
+                    <a:bodyPr/>
+                    <a:lstStyle/>
+                    <a:p>
+                      <a:r>
+                        <a:rPr lang="en-GB" dirty="0" smtClean="0"/>
+                        <a:t>P(Z)</a:t>
+                      </a:r>
+                      <a:endParaRPr lang="en-GB" dirty="0"/>
+                    </a:p>
+                  </a:txBody>
+                  <a:tcPr/>
+                </a:tc>
                 <a:tc>
                   <a:txBody>
                     <a:bodyPr/>
@@ -3226,7 +3252,21 @@
                     <a:p>
                       <a:r>
                         <a:rPr lang="en-GB" dirty="0" smtClean="0"/>
-                        <a:t>0.043</a:t>
+                        <a:t>TRUE</a:t>
+                      </a:r>
+                      <a:endParaRPr lang="en-GB" dirty="0"/>
+                    </a:p>
+                  </a:txBody>
+                  <a:tcPr/>
+                </a:tc>
+                <a:tc>
+                  <a:txBody>
+                    <a:bodyPr/>
+                    <a:lstStyle/>
+                    <a:p>
+                      <a:r>
+                        <a:rPr lang="en-GB" dirty="0" smtClean="0"/>
+                        <a:t>0.61</a:t>
                       </a:r>
                       <a:endParaRPr lang="en-GB" dirty="0"/>
                     </a:p>
@@ -3267,27 +3307,91 @@
                   </a:ext>
                 </a:extLst>
               </a:tr>
+              <a:tr h="370840">
+                <a:tc>
+                  <a:txBody>
+                    <a:bodyPr/>
+                    <a:lstStyle/>
+                    <a:p>
+                      <a:r>
+                        <a:rPr lang="en-GB" dirty="0" smtClean="0"/>
+                        <a:t>FALSE</a:t>
+                      </a:r>
+                      <a:endParaRPr lang="en-GB" dirty="0"/>
+                    </a:p>
+                  </a:txBody>
+                  <a:tcPr/>
+                </a:tc>
+                <a:tc>
+                  <a:txBody>
+                    <a:bodyPr/>
+                    <a:lstStyle/>
+                    <a:p>
+                      <a:r>
+                        <a:rPr lang="en-GB" dirty="0" smtClean="0"/>
+                        <a:t>0.043</a:t>
+                      </a:r>
+                      <a:endParaRPr lang="en-GB" dirty="0"/>
+                    </a:p>
+                  </a:txBody>
+                  <a:tcPr/>
+                </a:tc>
+                <a:tc>
+                  <a:txBody>
+                    <a:bodyPr/>
+                    <a:lstStyle/>
+                    <a:p>
+                      <a:r>
+                        <a:rPr lang="en-GB" dirty="0" smtClean="0"/>
+                        <a:t>0.902</a:t>
+                      </a:r>
+                      <a:endParaRPr lang="en-GB" dirty="0"/>
+                    </a:p>
+                  </a:txBody>
+                  <a:tcPr/>
+                </a:tc>
+                <a:tc>
+                  <a:txBody>
+                    <a:bodyPr/>
+                    <a:lstStyle/>
+                    <a:p>
+                      <a:r>
+                        <a:rPr lang="en-GB" dirty="0" smtClean="0"/>
+                        <a:t>0.902</a:t>
+                      </a:r>
+                      <a:endParaRPr lang="en-GB" dirty="0"/>
+                    </a:p>
+                  </a:txBody>
+                  <a:tcPr/>
+                </a:tc>
+                <a:extLst>
+                  <a:ext uri="{0D108BD9-81ED-4DB2-BD59-A6C34878D82A}">
+                    <a16:rowId xmlns:a16="http://schemas.microsoft.com/office/drawing/2014/main" val="1178666603"/>
+                  </a:ext>
+                </a:extLst>
+              </a:tr>
             </a:tbl>
           </a:graphicData>
         </a:graphic>
       </p:graphicFrame>
       <p:cxnSp>
         <p:nvCxnSpPr>
-          <p:cNvPr id="15" name="Straight Arrow Connector 14"/>
+          <p:cNvPr id="3" name="Straight Arrow Connector 2"/>
           <p:cNvCxnSpPr>
-            <a:endCxn id="10" idx="3"/>
+            <a:stCxn id="13" idx="2"/>
+            <a:endCxn id="11" idx="0"/>
           </p:cNvCxnSpPr>
           <p:nvPr/>
         </p:nvCxnSpPr>
         <p:spPr>
-          <a:xfrm flipH="1" flipV="1">
-            <a:off x="5087390" y="3235082"/>
-            <a:ext cx="778624" cy="962845"/>
+          <a:xfrm flipH="1">
+            <a:off x="6221614" y="3077811"/>
+            <a:ext cx="1502598" cy="910867"/>
           </a:xfrm>
           <a:prstGeom prst="straightConnector1">
             <a:avLst/>
           </a:prstGeom>
-          <a:ln>
+          <a:ln w="38100">
             <a:tailEnd type="triangle"/>
           </a:ln>
         </p:spPr>
@@ -3308,22 +3412,22 @@
       </p:cxnSp>
       <p:cxnSp>
         <p:nvCxnSpPr>
-          <p:cNvPr id="19" name="Straight Arrow Connector 18"/>
+          <p:cNvPr id="6" name="Straight Arrow Connector 5"/>
           <p:cNvCxnSpPr>
-            <a:stCxn id="11" idx="0"/>
-            <a:endCxn id="13" idx="2"/>
+            <a:stCxn id="10" idx="3"/>
+            <a:endCxn id="11" idx="0"/>
           </p:cNvCxnSpPr>
           <p:nvPr/>
         </p:nvCxnSpPr>
         <p:spPr>
-          <a:xfrm flipV="1">
-            <a:off x="6221614" y="2706971"/>
-            <a:ext cx="1034010" cy="1281707"/>
+          <a:xfrm>
+            <a:off x="5087390" y="3235082"/>
+            <a:ext cx="1134224" cy="753596"/>
           </a:xfrm>
           <a:prstGeom prst="straightConnector1">
             <a:avLst/>
           </a:prstGeom>
-          <a:ln>
+          <a:ln w="38100">
             <a:tailEnd type="triangle"/>
           </a:ln>
         </p:spPr>
@@ -3344,22 +3448,22 @@
       </p:cxnSp>
       <p:cxnSp>
         <p:nvCxnSpPr>
-          <p:cNvPr id="21" name="Straight Arrow Connector 20"/>
+          <p:cNvPr id="9" name="Straight Arrow Connector 8"/>
           <p:cNvCxnSpPr>
-            <a:stCxn id="13" idx="1"/>
-            <a:endCxn id="10" idx="3"/>
+            <a:stCxn id="10" idx="3"/>
+            <a:endCxn id="13" idx="1"/>
           </p:cNvCxnSpPr>
           <p:nvPr/>
         </p:nvCxnSpPr>
         <p:spPr>
-          <a:xfrm flipH="1">
-            <a:off x="5087390" y="2336131"/>
-            <a:ext cx="778624" cy="898951"/>
+          <a:xfrm flipV="1">
+            <a:off x="5087390" y="2521551"/>
+            <a:ext cx="778624" cy="713531"/>
           </a:xfrm>
           <a:prstGeom prst="straightConnector1">
             <a:avLst/>
           </a:prstGeom>
-          <a:ln>
+          <a:ln w="38100">
             <a:tailEnd type="triangle"/>
           </a:ln>
         </p:spPr>

</xml_diff>